<commit_message>
Added state space analysis and speech dsp
</commit_message>
<xml_diff>
--- a/NOV/img/images.pptx
+++ b/NOV/img/images.pptx
@@ -6,7 +6,8 @@
   </p:sldMasterIdLst>
   <p:sldIdLst>
     <p:sldId id="256" r:id="rId2"/>
-    <p:sldId id="257" r:id="rId3"/>
+    <p:sldId id="258" r:id="rId3"/>
+    <p:sldId id="257" r:id="rId4"/>
   </p:sldIdLst>
   <p:sldSz cx="12192000" cy="6858000"/>
   <p:notesSz cx="6858000" cy="9144000"/>
@@ -1218,6 +1219,13 @@
         </dgm:presLayoutVars>
       </dgm:prSet>
       <dgm:spPr/>
+      <dgm:t>
+        <a:bodyPr/>
+        <a:lstStyle/>
+        <a:p>
+          <a:endParaRPr lang="en-GB"/>
+        </a:p>
+      </dgm:t>
     </dgm:pt>
     <dgm:pt modelId="{56144D66-FB86-45AE-A33A-E9F7D053D5EE}" type="pres">
       <dgm:prSet presAssocID="{64202AC5-7621-4BEA-A4C3-4346A3B76C60}" presName="hierFlow" presStyleCnt="0"/>
@@ -1248,6 +1256,13 @@
         </dgm:presLayoutVars>
       </dgm:prSet>
       <dgm:spPr/>
+      <dgm:t>
+        <a:bodyPr/>
+        <a:lstStyle/>
+        <a:p>
+          <a:endParaRPr lang="en-GB"/>
+        </a:p>
+      </dgm:t>
     </dgm:pt>
     <dgm:pt modelId="{F979056C-F989-432C-89F0-090B669E7C56}" type="pres">
       <dgm:prSet presAssocID="{C91BAFB5-A6D7-454D-B4E8-165A4961C2A8}" presName="hierChild2" presStyleCnt="0"/>
@@ -1256,10 +1271,24 @@
     <dgm:pt modelId="{5479C08E-D141-4414-A115-E442B60FEC4D}" type="pres">
       <dgm:prSet presAssocID="{FD3216D4-CB88-4730-BBB1-718B00152892}" presName="Name25" presStyleLbl="parChTrans1D2" presStyleIdx="0" presStyleCnt="2"/>
       <dgm:spPr/>
+      <dgm:t>
+        <a:bodyPr/>
+        <a:lstStyle/>
+        <a:p>
+          <a:endParaRPr lang="en-GB"/>
+        </a:p>
+      </dgm:t>
     </dgm:pt>
     <dgm:pt modelId="{BF3AFFA4-062F-48CF-AB2D-DEA96162F64A}" type="pres">
       <dgm:prSet presAssocID="{FD3216D4-CB88-4730-BBB1-718B00152892}" presName="connTx" presStyleLbl="parChTrans1D2" presStyleIdx="0" presStyleCnt="2"/>
       <dgm:spPr/>
+      <dgm:t>
+        <a:bodyPr/>
+        <a:lstStyle/>
+        <a:p>
+          <a:endParaRPr lang="en-GB"/>
+        </a:p>
+      </dgm:t>
     </dgm:pt>
     <dgm:pt modelId="{CD43CB15-0E58-4F9A-89CB-2057231D4388}" type="pres">
       <dgm:prSet presAssocID="{645A7BD1-820A-4A94-85C9-51CAE17DD8BD}" presName="Name30" presStyleCnt="0"/>
@@ -1268,6 +1297,13 @@
     <dgm:pt modelId="{304546B6-6368-477C-9454-99808B6E531D}" type="pres">
       <dgm:prSet presAssocID="{645A7BD1-820A-4A94-85C9-51CAE17DD8BD}" presName="level2Shape" presStyleLbl="node2" presStyleIdx="0" presStyleCnt="2"/>
       <dgm:spPr/>
+      <dgm:t>
+        <a:bodyPr/>
+        <a:lstStyle/>
+        <a:p>
+          <a:endParaRPr lang="en-GB"/>
+        </a:p>
+      </dgm:t>
     </dgm:pt>
     <dgm:pt modelId="{A0FE47CF-F9DF-4308-9C09-4698E16E2C82}" type="pres">
       <dgm:prSet presAssocID="{645A7BD1-820A-4A94-85C9-51CAE17DD8BD}" presName="hierChild3" presStyleCnt="0"/>
@@ -1276,10 +1312,24 @@
     <dgm:pt modelId="{934B9D86-16B3-4B0B-9A7D-A424E84E9540}" type="pres">
       <dgm:prSet presAssocID="{D316DFA6-D15C-4369-8C33-424E939B0BC7}" presName="Name25" presStyleLbl="parChTrans1D3" presStyleIdx="0" presStyleCnt="3"/>
       <dgm:spPr/>
+      <dgm:t>
+        <a:bodyPr/>
+        <a:lstStyle/>
+        <a:p>
+          <a:endParaRPr lang="en-GB"/>
+        </a:p>
+      </dgm:t>
     </dgm:pt>
     <dgm:pt modelId="{BC20CA0E-A358-4DE7-B27D-F4C540E72D4F}" type="pres">
       <dgm:prSet presAssocID="{D316DFA6-D15C-4369-8C33-424E939B0BC7}" presName="connTx" presStyleLbl="parChTrans1D3" presStyleIdx="0" presStyleCnt="3"/>
       <dgm:spPr/>
+      <dgm:t>
+        <a:bodyPr/>
+        <a:lstStyle/>
+        <a:p>
+          <a:endParaRPr lang="en-GB"/>
+        </a:p>
+      </dgm:t>
     </dgm:pt>
     <dgm:pt modelId="{FD3CC20A-D895-48EF-B4D0-B77F89B43542}" type="pres">
       <dgm:prSet presAssocID="{22665F06-27B5-4CFC-998E-1AA885C93314}" presName="Name30" presStyleCnt="0"/>
@@ -1288,6 +1338,13 @@
     <dgm:pt modelId="{A4E9D010-33E6-4695-896B-B387183646F7}" type="pres">
       <dgm:prSet presAssocID="{22665F06-27B5-4CFC-998E-1AA885C93314}" presName="level2Shape" presStyleLbl="node3" presStyleIdx="0" presStyleCnt="3"/>
       <dgm:spPr/>
+      <dgm:t>
+        <a:bodyPr/>
+        <a:lstStyle/>
+        <a:p>
+          <a:endParaRPr lang="en-GB"/>
+        </a:p>
+      </dgm:t>
     </dgm:pt>
     <dgm:pt modelId="{C8407893-5B8F-42FA-BD62-5174DDCE7F95}" type="pres">
       <dgm:prSet presAssocID="{22665F06-27B5-4CFC-998E-1AA885C93314}" presName="hierChild3" presStyleCnt="0"/>
@@ -1296,10 +1353,24 @@
     <dgm:pt modelId="{35695188-4D5E-4DC3-8F92-104BAF725286}" type="pres">
       <dgm:prSet presAssocID="{BC01E95B-D8A1-4016-A1FF-2DB86A3D319D}" presName="Name25" presStyleLbl="parChTrans1D3" presStyleIdx="1" presStyleCnt="3"/>
       <dgm:spPr/>
+      <dgm:t>
+        <a:bodyPr/>
+        <a:lstStyle/>
+        <a:p>
+          <a:endParaRPr lang="en-GB"/>
+        </a:p>
+      </dgm:t>
     </dgm:pt>
     <dgm:pt modelId="{D7E578AC-26C7-4AC2-BC78-B7F1D9A07984}" type="pres">
       <dgm:prSet presAssocID="{BC01E95B-D8A1-4016-A1FF-2DB86A3D319D}" presName="connTx" presStyleLbl="parChTrans1D3" presStyleIdx="1" presStyleCnt="3"/>
       <dgm:spPr/>
+      <dgm:t>
+        <a:bodyPr/>
+        <a:lstStyle/>
+        <a:p>
+          <a:endParaRPr lang="en-GB"/>
+        </a:p>
+      </dgm:t>
     </dgm:pt>
     <dgm:pt modelId="{93DF7CBB-1FE5-4E89-A3E1-CB0B0141A8BE}" type="pres">
       <dgm:prSet presAssocID="{73524CFE-BD8B-481D-AB6A-6C5DF6C9E4E1}" presName="Name30" presStyleCnt="0"/>
@@ -1308,6 +1379,13 @@
     <dgm:pt modelId="{2FFE2959-7013-4275-97FE-0D718B9603CE}" type="pres">
       <dgm:prSet presAssocID="{73524CFE-BD8B-481D-AB6A-6C5DF6C9E4E1}" presName="level2Shape" presStyleLbl="node3" presStyleIdx="1" presStyleCnt="3"/>
       <dgm:spPr/>
+      <dgm:t>
+        <a:bodyPr/>
+        <a:lstStyle/>
+        <a:p>
+          <a:endParaRPr lang="en-GB"/>
+        </a:p>
+      </dgm:t>
     </dgm:pt>
     <dgm:pt modelId="{09B6136B-02BE-4449-A6D9-5C540119A3F2}" type="pres">
       <dgm:prSet presAssocID="{73524CFE-BD8B-481D-AB6A-6C5DF6C9E4E1}" presName="hierChild3" presStyleCnt="0"/>
@@ -1316,10 +1394,24 @@
     <dgm:pt modelId="{8373141E-6E89-469C-8C2C-2222A4818AE9}" type="pres">
       <dgm:prSet presAssocID="{AB3699B2-8561-454A-806E-9D089908F7A6}" presName="Name25" presStyleLbl="parChTrans1D2" presStyleIdx="1" presStyleCnt="2"/>
       <dgm:spPr/>
+      <dgm:t>
+        <a:bodyPr/>
+        <a:lstStyle/>
+        <a:p>
+          <a:endParaRPr lang="en-GB"/>
+        </a:p>
+      </dgm:t>
     </dgm:pt>
     <dgm:pt modelId="{857A7D8A-0AA1-403A-AB2E-7E94CA1880A6}" type="pres">
       <dgm:prSet presAssocID="{AB3699B2-8561-454A-806E-9D089908F7A6}" presName="connTx" presStyleLbl="parChTrans1D2" presStyleIdx="1" presStyleCnt="2"/>
       <dgm:spPr/>
+      <dgm:t>
+        <a:bodyPr/>
+        <a:lstStyle/>
+        <a:p>
+          <a:endParaRPr lang="en-GB"/>
+        </a:p>
+      </dgm:t>
     </dgm:pt>
     <dgm:pt modelId="{DAFBC4D5-5B97-40AA-8E74-21D53B53EC0B}" type="pres">
       <dgm:prSet presAssocID="{13558860-2432-4B23-A59D-A5A5E1E91322}" presName="Name30" presStyleCnt="0"/>
@@ -1328,6 +1420,13 @@
     <dgm:pt modelId="{ADE5334B-5F7D-4014-85B2-3ADEB4103056}" type="pres">
       <dgm:prSet presAssocID="{13558860-2432-4B23-A59D-A5A5E1E91322}" presName="level2Shape" presStyleLbl="node2" presStyleIdx="1" presStyleCnt="2"/>
       <dgm:spPr/>
+      <dgm:t>
+        <a:bodyPr/>
+        <a:lstStyle/>
+        <a:p>
+          <a:endParaRPr lang="en-GB"/>
+        </a:p>
+      </dgm:t>
     </dgm:pt>
     <dgm:pt modelId="{4E157B58-2077-483D-BFB3-160DA4600754}" type="pres">
       <dgm:prSet presAssocID="{13558860-2432-4B23-A59D-A5A5E1E91322}" presName="hierChild3" presStyleCnt="0"/>
@@ -1336,10 +1435,24 @@
     <dgm:pt modelId="{C3AA3DF1-7072-4B04-A0D9-3CC73D165D16}" type="pres">
       <dgm:prSet presAssocID="{29D0DE6F-62F6-4234-8A17-F0F949D6F6F2}" presName="Name25" presStyleLbl="parChTrans1D3" presStyleIdx="2" presStyleCnt="3"/>
       <dgm:spPr/>
+      <dgm:t>
+        <a:bodyPr/>
+        <a:lstStyle/>
+        <a:p>
+          <a:endParaRPr lang="en-GB"/>
+        </a:p>
+      </dgm:t>
     </dgm:pt>
     <dgm:pt modelId="{27276609-32E0-4F2A-844A-06268B023994}" type="pres">
       <dgm:prSet presAssocID="{29D0DE6F-62F6-4234-8A17-F0F949D6F6F2}" presName="connTx" presStyleLbl="parChTrans1D3" presStyleIdx="2" presStyleCnt="3"/>
       <dgm:spPr/>
+      <dgm:t>
+        <a:bodyPr/>
+        <a:lstStyle/>
+        <a:p>
+          <a:endParaRPr lang="en-GB"/>
+        </a:p>
+      </dgm:t>
     </dgm:pt>
     <dgm:pt modelId="{423EBE52-43FD-4BA6-B00A-E22E6A579CE0}" type="pres">
       <dgm:prSet presAssocID="{9B364363-80C2-4ED6-9A5E-D57780958CBF}" presName="Name30" presStyleCnt="0"/>
@@ -1348,6 +1461,13 @@
     <dgm:pt modelId="{E44DFEB6-D973-460F-AC4F-40368BFA49D2}" type="pres">
       <dgm:prSet presAssocID="{9B364363-80C2-4ED6-9A5E-D57780958CBF}" presName="level2Shape" presStyleLbl="node3" presStyleIdx="2" presStyleCnt="3"/>
       <dgm:spPr/>
+      <dgm:t>
+        <a:bodyPr/>
+        <a:lstStyle/>
+        <a:p>
+          <a:endParaRPr lang="en-GB"/>
+        </a:p>
+      </dgm:t>
     </dgm:pt>
     <dgm:pt modelId="{F6386710-A2B1-4396-A238-D00C12F37BC8}" type="pres">
       <dgm:prSet presAssocID="{9B364363-80C2-4ED6-9A5E-D57780958CBF}" presName="hierChild3" presStyleCnt="0"/>
@@ -1440,6 +1560,13 @@
     <dgm:pt modelId="{A6150320-98F9-427D-850C-EF89B9801654}" type="pres">
       <dgm:prSet presAssocID="{40B239C4-28FD-4786-82E1-CE8964C229EE}" presName="bgRect" presStyleLbl="bgShp" presStyleIdx="2" presStyleCnt="3"/>
       <dgm:spPr/>
+      <dgm:t>
+        <a:bodyPr/>
+        <a:lstStyle/>
+        <a:p>
+          <a:endParaRPr lang="en-GB"/>
+        </a:p>
+      </dgm:t>
     </dgm:pt>
     <dgm:pt modelId="{C2BDCCFD-A3DD-47E4-B0F1-7088FBEA944B}" type="pres">
       <dgm:prSet presAssocID="{40B239C4-28FD-4786-82E1-CE8964C229EE}" presName="bgRectTx" presStyleLbl="bgShp" presStyleIdx="2" presStyleCnt="3">
@@ -1448,41 +1575,48 @@
         </dgm:presLayoutVars>
       </dgm:prSet>
       <dgm:spPr/>
+      <dgm:t>
+        <a:bodyPr/>
+        <a:lstStyle/>
+        <a:p>
+          <a:endParaRPr lang="en-GB"/>
+        </a:p>
+      </dgm:t>
     </dgm:pt>
   </dgm:ptLst>
   <dgm:cxnLst>
+    <dgm:cxn modelId="{14693F1D-CBA9-4AFF-BA55-36CF0CFF8783}" type="presOf" srcId="{645A7BD1-820A-4A94-85C9-51CAE17DD8BD}" destId="{304546B6-6368-477C-9454-99808B6E531D}" srcOrd="0" destOrd="0" presId="urn:microsoft.com/office/officeart/2005/8/layout/hierarchy5"/>
+    <dgm:cxn modelId="{29DC4A53-8ADF-4224-A6B7-81473E76D3A5}" srcId="{13558860-2432-4B23-A59D-A5A5E1E91322}" destId="{9B364363-80C2-4ED6-9A5E-D57780958CBF}" srcOrd="0" destOrd="0" parTransId="{29D0DE6F-62F6-4234-8A17-F0F949D6F6F2}" sibTransId="{A8236A71-C4D9-4D99-A691-F15327725F34}"/>
+    <dgm:cxn modelId="{D0FEBC03-D910-4BEE-9EE8-A6ACEF3EB712}" type="presOf" srcId="{64202AC5-7621-4BEA-A4C3-4346A3B76C60}" destId="{22CFCC7D-D6FB-49DD-BAD7-8A4B586ECB8D}" srcOrd="0" destOrd="0" presId="urn:microsoft.com/office/officeart/2005/8/layout/hierarchy5"/>
+    <dgm:cxn modelId="{37C6713E-DE14-43D1-9ED4-5AA8D0BFEED6}" type="presOf" srcId="{29D0DE6F-62F6-4234-8A17-F0F949D6F6F2}" destId="{C3AA3DF1-7072-4B04-A0D9-3CC73D165D16}" srcOrd="0" destOrd="0" presId="urn:microsoft.com/office/officeart/2005/8/layout/hierarchy5"/>
+    <dgm:cxn modelId="{76B536AD-64B2-4A27-9143-2F07A099080B}" type="presOf" srcId="{D97AAC04-45EB-4D63-A223-94B3DDD4B6F7}" destId="{FA50A609-1686-4EE3-B1D8-0823ED3BF084}" srcOrd="0" destOrd="0" presId="urn:microsoft.com/office/officeart/2005/8/layout/hierarchy5"/>
+    <dgm:cxn modelId="{20817D41-D9C3-464F-83EE-04655CD6DCFA}" type="presOf" srcId="{FD3216D4-CB88-4730-BBB1-718B00152892}" destId="{BF3AFFA4-062F-48CF-AB2D-DEA96162F64A}" srcOrd="1" destOrd="0" presId="urn:microsoft.com/office/officeart/2005/8/layout/hierarchy5"/>
+    <dgm:cxn modelId="{B6B46424-BAC5-43DF-B218-92C8166D3C9A}" srcId="{64202AC5-7621-4BEA-A4C3-4346A3B76C60}" destId="{40B239C4-28FD-4786-82E1-CE8964C229EE}" srcOrd="3" destOrd="0" parTransId="{960179C2-2CB0-4855-B2D8-756AABAA4C52}" sibTransId="{8FFA6799-5F63-4CE2-8037-BE225643027C}"/>
+    <dgm:cxn modelId="{95056C6F-94E8-4185-8118-20608CD79E6A}" srcId="{645A7BD1-820A-4A94-85C9-51CAE17DD8BD}" destId="{22665F06-27B5-4CFC-998E-1AA885C93314}" srcOrd="0" destOrd="0" parTransId="{D316DFA6-D15C-4369-8C33-424E939B0BC7}" sibTransId="{0513C8A6-1ABE-4268-A980-D05EF606D529}"/>
+    <dgm:cxn modelId="{44F6E36A-3734-4773-80A2-44DAE5750674}" type="presOf" srcId="{D316DFA6-D15C-4369-8C33-424E939B0BC7}" destId="{BC20CA0E-A358-4DE7-B27D-F4C540E72D4F}" srcOrd="1" destOrd="0" presId="urn:microsoft.com/office/officeart/2005/8/layout/hierarchy5"/>
+    <dgm:cxn modelId="{4487CC81-177D-4ED5-9528-82AC1DB30DFD}" type="presOf" srcId="{9B364363-80C2-4ED6-9A5E-D57780958CBF}" destId="{E44DFEB6-D973-460F-AC4F-40368BFA49D2}" srcOrd="0" destOrd="0" presId="urn:microsoft.com/office/officeart/2005/8/layout/hierarchy5"/>
+    <dgm:cxn modelId="{B475F859-D147-45B8-AD26-6E70AA8F727E}" type="presOf" srcId="{596AB4A6-0F1A-4023-B6EF-8E441759BDB0}" destId="{8E119355-392E-4C42-8A78-F0AE50F9CF16}" srcOrd="1" destOrd="0" presId="urn:microsoft.com/office/officeart/2005/8/layout/hierarchy5"/>
+    <dgm:cxn modelId="{17BAD398-96CC-441A-B91E-07A303A91401}" type="presOf" srcId="{FD3216D4-CB88-4730-BBB1-718B00152892}" destId="{5479C08E-D141-4414-A115-E442B60FEC4D}" srcOrd="0" destOrd="0" presId="urn:microsoft.com/office/officeart/2005/8/layout/hierarchy5"/>
+    <dgm:cxn modelId="{5017BEC3-AC64-4EDE-B12D-A0A8A6795EDE}" type="presOf" srcId="{73524CFE-BD8B-481D-AB6A-6C5DF6C9E4E1}" destId="{2FFE2959-7013-4275-97FE-0D718B9603CE}" srcOrd="0" destOrd="0" presId="urn:microsoft.com/office/officeart/2005/8/layout/hierarchy5"/>
+    <dgm:cxn modelId="{861A73F0-B450-4A39-9A1E-A17C17040A30}" srcId="{C91BAFB5-A6D7-454D-B4E8-165A4961C2A8}" destId="{13558860-2432-4B23-A59D-A5A5E1E91322}" srcOrd="1" destOrd="0" parTransId="{AB3699B2-8561-454A-806E-9D089908F7A6}" sibTransId="{A166CA5E-FBD0-4829-A076-940288435130}"/>
+    <dgm:cxn modelId="{6191B307-4B73-4EF6-975C-10F3D58CF978}" type="presOf" srcId="{29D0DE6F-62F6-4234-8A17-F0F949D6F6F2}" destId="{27276609-32E0-4F2A-844A-06268B023994}" srcOrd="1" destOrd="0" presId="urn:microsoft.com/office/officeart/2005/8/layout/hierarchy5"/>
+    <dgm:cxn modelId="{C8E7F9D9-E56A-4C4F-B750-036B2C4BE301}" type="presOf" srcId="{AB3699B2-8561-454A-806E-9D089908F7A6}" destId="{8373141E-6E89-469C-8C2C-2222A4818AE9}" srcOrd="0" destOrd="0" presId="urn:microsoft.com/office/officeart/2005/8/layout/hierarchy5"/>
+    <dgm:cxn modelId="{5D65786B-885B-4C67-A61C-7844AA5E0644}" srcId="{64202AC5-7621-4BEA-A4C3-4346A3B76C60}" destId="{D97AAC04-45EB-4D63-A223-94B3DDD4B6F7}" srcOrd="1" destOrd="0" parTransId="{E3563EDF-AC43-4A88-ADE7-D070FBD5F31A}" sibTransId="{28D6891D-24BA-4D80-8DFC-A51E7D608B49}"/>
+    <dgm:cxn modelId="{0AC9E053-DDA5-4078-BCA3-2EB54D43ABA7}" type="presOf" srcId="{40B239C4-28FD-4786-82E1-CE8964C229EE}" destId="{A6150320-98F9-427D-850C-EF89B9801654}" srcOrd="0" destOrd="0" presId="urn:microsoft.com/office/officeart/2005/8/layout/hierarchy5"/>
+    <dgm:cxn modelId="{015DE5E7-8979-44BD-97FE-EE1FEAD7F829}" type="presOf" srcId="{C91BAFB5-A6D7-454D-B4E8-165A4961C2A8}" destId="{216E6CCD-2C2C-4AEE-BD07-0696D423DD9F}" srcOrd="0" destOrd="0" presId="urn:microsoft.com/office/officeart/2005/8/layout/hierarchy5"/>
+    <dgm:cxn modelId="{610E928D-B2BB-4A62-9A73-A59DAE06099E}" srcId="{645A7BD1-820A-4A94-85C9-51CAE17DD8BD}" destId="{73524CFE-BD8B-481D-AB6A-6C5DF6C9E4E1}" srcOrd="1" destOrd="0" parTransId="{BC01E95B-D8A1-4016-A1FF-2DB86A3D319D}" sibTransId="{798DF8A6-D1BA-4602-98C0-C3428D5E596C}"/>
+    <dgm:cxn modelId="{A2B5DA7A-536E-49FC-A6E6-182D14F8BEB1}" srcId="{C91BAFB5-A6D7-454D-B4E8-165A4961C2A8}" destId="{645A7BD1-820A-4A94-85C9-51CAE17DD8BD}" srcOrd="0" destOrd="0" parTransId="{FD3216D4-CB88-4730-BBB1-718B00152892}" sibTransId="{BC56E52A-C754-4F3E-956C-D0A4491BD03D}"/>
+    <dgm:cxn modelId="{647B2205-FB1C-4C52-819A-4FC0CFF64975}" type="presOf" srcId="{D316DFA6-D15C-4369-8C33-424E939B0BC7}" destId="{934B9D86-16B3-4B0B-9A7D-A424E84E9540}" srcOrd="0" destOrd="0" presId="urn:microsoft.com/office/officeart/2005/8/layout/hierarchy5"/>
+    <dgm:cxn modelId="{7D65430C-C2D5-4D81-BB09-0BAA5133F742}" type="presOf" srcId="{22665F06-27B5-4CFC-998E-1AA885C93314}" destId="{A4E9D010-33E6-4695-896B-B387183646F7}" srcOrd="0" destOrd="0" presId="urn:microsoft.com/office/officeart/2005/8/layout/hierarchy5"/>
+    <dgm:cxn modelId="{5E44B950-B740-49F6-AA7D-FDE17DA603B3}" type="presOf" srcId="{D97AAC04-45EB-4D63-A223-94B3DDD4B6F7}" destId="{4C2EF9B0-CFB7-43C7-A9B1-7059A05BE40D}" srcOrd="1" destOrd="0" presId="urn:microsoft.com/office/officeart/2005/8/layout/hierarchy5"/>
+    <dgm:cxn modelId="{F88EBC0C-F61B-4C15-A927-9A1039E3F90A}" type="presOf" srcId="{BC01E95B-D8A1-4016-A1FF-2DB86A3D319D}" destId="{35695188-4D5E-4DC3-8F92-104BAF725286}" srcOrd="0" destOrd="0" presId="urn:microsoft.com/office/officeart/2005/8/layout/hierarchy5"/>
+    <dgm:cxn modelId="{6A4588BD-1F34-4726-B6EC-02C8C5F3052E}" type="presOf" srcId="{40B239C4-28FD-4786-82E1-CE8964C229EE}" destId="{C2BDCCFD-A3DD-47E4-B0F1-7088FBEA944B}" srcOrd="1" destOrd="0" presId="urn:microsoft.com/office/officeart/2005/8/layout/hierarchy5"/>
+    <dgm:cxn modelId="{26408113-CC49-485D-85E7-3B0F069DA9A0}" srcId="{64202AC5-7621-4BEA-A4C3-4346A3B76C60}" destId="{C91BAFB5-A6D7-454D-B4E8-165A4961C2A8}" srcOrd="0" destOrd="0" parTransId="{65699593-C987-4A39-82B9-6F49FE2FDDF9}" sibTransId="{9A537FD6-0CC6-4E77-B06A-3950548C9465}"/>
+    <dgm:cxn modelId="{83A011F0-7CCF-46CA-B586-32A76EB4D608}" type="presOf" srcId="{13558860-2432-4B23-A59D-A5A5E1E91322}" destId="{ADE5334B-5F7D-4014-85B2-3ADEB4103056}" srcOrd="0" destOrd="0" presId="urn:microsoft.com/office/officeart/2005/8/layout/hierarchy5"/>
+    <dgm:cxn modelId="{D4110127-E291-4596-B532-97D07B476D33}" type="presOf" srcId="{AB3699B2-8561-454A-806E-9D089908F7A6}" destId="{857A7D8A-0AA1-403A-AB2E-7E94CA1880A6}" srcOrd="1" destOrd="0" presId="urn:microsoft.com/office/officeart/2005/8/layout/hierarchy5"/>
+    <dgm:cxn modelId="{523A9E7C-0D27-4710-A790-D0D8EF49DA26}" srcId="{64202AC5-7621-4BEA-A4C3-4346A3B76C60}" destId="{596AB4A6-0F1A-4023-B6EF-8E441759BDB0}" srcOrd="2" destOrd="0" parTransId="{BE8D69FA-26A0-4589-900B-80E515675091}" sibTransId="{FB79C6AC-2F32-4EE1-8518-17257CF4449D}"/>
     <dgm:cxn modelId="{BBB180CA-7879-4CC2-8BB0-941F248AE749}" type="presOf" srcId="{596AB4A6-0F1A-4023-B6EF-8E441759BDB0}" destId="{5FDB450B-16BA-49B2-B9A1-8D77E23EE14C}" srcOrd="0" destOrd="0" presId="urn:microsoft.com/office/officeart/2005/8/layout/hierarchy5"/>
-    <dgm:cxn modelId="{B475F859-D147-45B8-AD26-6E70AA8F727E}" type="presOf" srcId="{596AB4A6-0F1A-4023-B6EF-8E441759BDB0}" destId="{8E119355-392E-4C42-8A78-F0AE50F9CF16}" srcOrd="1" destOrd="0" presId="urn:microsoft.com/office/officeart/2005/8/layout/hierarchy5"/>
-    <dgm:cxn modelId="{5E44B950-B740-49F6-AA7D-FDE17DA603B3}" type="presOf" srcId="{D97AAC04-45EB-4D63-A223-94B3DDD4B6F7}" destId="{4C2EF9B0-CFB7-43C7-A9B1-7059A05BE40D}" srcOrd="1" destOrd="0" presId="urn:microsoft.com/office/officeart/2005/8/layout/hierarchy5"/>
-    <dgm:cxn modelId="{523A9E7C-0D27-4710-A790-D0D8EF49DA26}" srcId="{64202AC5-7621-4BEA-A4C3-4346A3B76C60}" destId="{596AB4A6-0F1A-4023-B6EF-8E441759BDB0}" srcOrd="2" destOrd="0" parTransId="{BE8D69FA-26A0-4589-900B-80E515675091}" sibTransId="{FB79C6AC-2F32-4EE1-8518-17257CF4449D}"/>
-    <dgm:cxn modelId="{17BAD398-96CC-441A-B91E-07A303A91401}" type="presOf" srcId="{FD3216D4-CB88-4730-BBB1-718B00152892}" destId="{5479C08E-D141-4414-A115-E442B60FEC4D}" srcOrd="0" destOrd="0" presId="urn:microsoft.com/office/officeart/2005/8/layout/hierarchy5"/>
-    <dgm:cxn modelId="{861A73F0-B450-4A39-9A1E-A17C17040A30}" srcId="{C91BAFB5-A6D7-454D-B4E8-165A4961C2A8}" destId="{13558860-2432-4B23-A59D-A5A5E1E91322}" srcOrd="1" destOrd="0" parTransId="{AB3699B2-8561-454A-806E-9D089908F7A6}" sibTransId="{A166CA5E-FBD0-4829-A076-940288435130}"/>
-    <dgm:cxn modelId="{95056C6F-94E8-4185-8118-20608CD79E6A}" srcId="{645A7BD1-820A-4A94-85C9-51CAE17DD8BD}" destId="{22665F06-27B5-4CFC-998E-1AA885C93314}" srcOrd="0" destOrd="0" parTransId="{D316DFA6-D15C-4369-8C33-424E939B0BC7}" sibTransId="{0513C8A6-1ABE-4268-A980-D05EF606D529}"/>
-    <dgm:cxn modelId="{D4110127-E291-4596-B532-97D07B476D33}" type="presOf" srcId="{AB3699B2-8561-454A-806E-9D089908F7A6}" destId="{857A7D8A-0AA1-403A-AB2E-7E94CA1880A6}" srcOrd="1" destOrd="0" presId="urn:microsoft.com/office/officeart/2005/8/layout/hierarchy5"/>
-    <dgm:cxn modelId="{14693F1D-CBA9-4AFF-BA55-36CF0CFF8783}" type="presOf" srcId="{645A7BD1-820A-4A94-85C9-51CAE17DD8BD}" destId="{304546B6-6368-477C-9454-99808B6E531D}" srcOrd="0" destOrd="0" presId="urn:microsoft.com/office/officeart/2005/8/layout/hierarchy5"/>
-    <dgm:cxn modelId="{C8E7F9D9-E56A-4C4F-B750-036B2C4BE301}" type="presOf" srcId="{AB3699B2-8561-454A-806E-9D089908F7A6}" destId="{8373141E-6E89-469C-8C2C-2222A4818AE9}" srcOrd="0" destOrd="0" presId="urn:microsoft.com/office/officeart/2005/8/layout/hierarchy5"/>
-    <dgm:cxn modelId="{6A4588BD-1F34-4726-B6EC-02C8C5F3052E}" type="presOf" srcId="{40B239C4-28FD-4786-82E1-CE8964C229EE}" destId="{C2BDCCFD-A3DD-47E4-B0F1-7088FBEA944B}" srcOrd="1" destOrd="0" presId="urn:microsoft.com/office/officeart/2005/8/layout/hierarchy5"/>
-    <dgm:cxn modelId="{647B2205-FB1C-4C52-819A-4FC0CFF64975}" type="presOf" srcId="{D316DFA6-D15C-4369-8C33-424E939B0BC7}" destId="{934B9D86-16B3-4B0B-9A7D-A424E84E9540}" srcOrd="0" destOrd="0" presId="urn:microsoft.com/office/officeart/2005/8/layout/hierarchy5"/>
-    <dgm:cxn modelId="{A2B5DA7A-536E-49FC-A6E6-182D14F8BEB1}" srcId="{C91BAFB5-A6D7-454D-B4E8-165A4961C2A8}" destId="{645A7BD1-820A-4A94-85C9-51CAE17DD8BD}" srcOrd="0" destOrd="0" parTransId="{FD3216D4-CB88-4730-BBB1-718B00152892}" sibTransId="{BC56E52A-C754-4F3E-956C-D0A4491BD03D}"/>
-    <dgm:cxn modelId="{76B536AD-64B2-4A27-9143-2F07A099080B}" type="presOf" srcId="{D97AAC04-45EB-4D63-A223-94B3DDD4B6F7}" destId="{FA50A609-1686-4EE3-B1D8-0823ED3BF084}" srcOrd="0" destOrd="0" presId="urn:microsoft.com/office/officeart/2005/8/layout/hierarchy5"/>
-    <dgm:cxn modelId="{610E928D-B2BB-4A62-9A73-A59DAE06099E}" srcId="{645A7BD1-820A-4A94-85C9-51CAE17DD8BD}" destId="{73524CFE-BD8B-481D-AB6A-6C5DF6C9E4E1}" srcOrd="1" destOrd="0" parTransId="{BC01E95B-D8A1-4016-A1FF-2DB86A3D319D}" sibTransId="{798DF8A6-D1BA-4602-98C0-C3428D5E596C}"/>
-    <dgm:cxn modelId="{5D65786B-885B-4C67-A61C-7844AA5E0644}" srcId="{64202AC5-7621-4BEA-A4C3-4346A3B76C60}" destId="{D97AAC04-45EB-4D63-A223-94B3DDD4B6F7}" srcOrd="1" destOrd="0" parTransId="{E3563EDF-AC43-4A88-ADE7-D070FBD5F31A}" sibTransId="{28D6891D-24BA-4D80-8DFC-A51E7D608B49}"/>
-    <dgm:cxn modelId="{5017BEC3-AC64-4EDE-B12D-A0A8A6795EDE}" type="presOf" srcId="{73524CFE-BD8B-481D-AB6A-6C5DF6C9E4E1}" destId="{2FFE2959-7013-4275-97FE-0D718B9603CE}" srcOrd="0" destOrd="0" presId="urn:microsoft.com/office/officeart/2005/8/layout/hierarchy5"/>
-    <dgm:cxn modelId="{0AC9E053-DDA5-4078-BCA3-2EB54D43ABA7}" type="presOf" srcId="{40B239C4-28FD-4786-82E1-CE8964C229EE}" destId="{A6150320-98F9-427D-850C-EF89B9801654}" srcOrd="0" destOrd="0" presId="urn:microsoft.com/office/officeart/2005/8/layout/hierarchy5"/>
-    <dgm:cxn modelId="{20817D41-D9C3-464F-83EE-04655CD6DCFA}" type="presOf" srcId="{FD3216D4-CB88-4730-BBB1-718B00152892}" destId="{BF3AFFA4-062F-48CF-AB2D-DEA96162F64A}" srcOrd="1" destOrd="0" presId="urn:microsoft.com/office/officeart/2005/8/layout/hierarchy5"/>
-    <dgm:cxn modelId="{26408113-CC49-485D-85E7-3B0F069DA9A0}" srcId="{64202AC5-7621-4BEA-A4C3-4346A3B76C60}" destId="{C91BAFB5-A6D7-454D-B4E8-165A4961C2A8}" srcOrd="0" destOrd="0" parTransId="{65699593-C987-4A39-82B9-6F49FE2FDDF9}" sibTransId="{9A537FD6-0CC6-4E77-B06A-3950548C9465}"/>
     <dgm:cxn modelId="{3545FFE3-3569-405B-A413-090C58D073DD}" type="presOf" srcId="{BC01E95B-D8A1-4016-A1FF-2DB86A3D319D}" destId="{D7E578AC-26C7-4AC2-BC78-B7F1D9A07984}" srcOrd="1" destOrd="0" presId="urn:microsoft.com/office/officeart/2005/8/layout/hierarchy5"/>
-    <dgm:cxn modelId="{83A011F0-7CCF-46CA-B586-32A76EB4D608}" type="presOf" srcId="{13558860-2432-4B23-A59D-A5A5E1E91322}" destId="{ADE5334B-5F7D-4014-85B2-3ADEB4103056}" srcOrd="0" destOrd="0" presId="urn:microsoft.com/office/officeart/2005/8/layout/hierarchy5"/>
-    <dgm:cxn modelId="{29DC4A53-8ADF-4224-A6B7-81473E76D3A5}" srcId="{13558860-2432-4B23-A59D-A5A5E1E91322}" destId="{9B364363-80C2-4ED6-9A5E-D57780958CBF}" srcOrd="0" destOrd="0" parTransId="{29D0DE6F-62F6-4234-8A17-F0F949D6F6F2}" sibTransId="{A8236A71-C4D9-4D99-A691-F15327725F34}"/>
-    <dgm:cxn modelId="{44F6E36A-3734-4773-80A2-44DAE5750674}" type="presOf" srcId="{D316DFA6-D15C-4369-8C33-424E939B0BC7}" destId="{BC20CA0E-A358-4DE7-B27D-F4C540E72D4F}" srcOrd="1" destOrd="0" presId="urn:microsoft.com/office/officeart/2005/8/layout/hierarchy5"/>
-    <dgm:cxn modelId="{015DE5E7-8979-44BD-97FE-EE1FEAD7F829}" type="presOf" srcId="{C91BAFB5-A6D7-454D-B4E8-165A4961C2A8}" destId="{216E6CCD-2C2C-4AEE-BD07-0696D423DD9F}" srcOrd="0" destOrd="0" presId="urn:microsoft.com/office/officeart/2005/8/layout/hierarchy5"/>
-    <dgm:cxn modelId="{6191B307-4B73-4EF6-975C-10F3D58CF978}" type="presOf" srcId="{29D0DE6F-62F6-4234-8A17-F0F949D6F6F2}" destId="{27276609-32E0-4F2A-844A-06268B023994}" srcOrd="1" destOrd="0" presId="urn:microsoft.com/office/officeart/2005/8/layout/hierarchy5"/>
-    <dgm:cxn modelId="{37C6713E-DE14-43D1-9ED4-5AA8D0BFEED6}" type="presOf" srcId="{29D0DE6F-62F6-4234-8A17-F0F949D6F6F2}" destId="{C3AA3DF1-7072-4B04-A0D9-3CC73D165D16}" srcOrd="0" destOrd="0" presId="urn:microsoft.com/office/officeart/2005/8/layout/hierarchy5"/>
-    <dgm:cxn modelId="{D0FEBC03-D910-4BEE-9EE8-A6ACEF3EB712}" type="presOf" srcId="{64202AC5-7621-4BEA-A4C3-4346A3B76C60}" destId="{22CFCC7D-D6FB-49DD-BAD7-8A4B586ECB8D}" srcOrd="0" destOrd="0" presId="urn:microsoft.com/office/officeart/2005/8/layout/hierarchy5"/>
-    <dgm:cxn modelId="{4487CC81-177D-4ED5-9528-82AC1DB30DFD}" type="presOf" srcId="{9B364363-80C2-4ED6-9A5E-D57780958CBF}" destId="{E44DFEB6-D973-460F-AC4F-40368BFA49D2}" srcOrd="0" destOrd="0" presId="urn:microsoft.com/office/officeart/2005/8/layout/hierarchy5"/>
-    <dgm:cxn modelId="{7D65430C-C2D5-4D81-BB09-0BAA5133F742}" type="presOf" srcId="{22665F06-27B5-4CFC-998E-1AA885C93314}" destId="{A4E9D010-33E6-4695-896B-B387183646F7}" srcOrd="0" destOrd="0" presId="urn:microsoft.com/office/officeart/2005/8/layout/hierarchy5"/>
-    <dgm:cxn modelId="{F88EBC0C-F61B-4C15-A927-9A1039E3F90A}" type="presOf" srcId="{BC01E95B-D8A1-4016-A1FF-2DB86A3D319D}" destId="{35695188-4D5E-4DC3-8F92-104BAF725286}" srcOrd="0" destOrd="0" presId="urn:microsoft.com/office/officeart/2005/8/layout/hierarchy5"/>
-    <dgm:cxn modelId="{B6B46424-BAC5-43DF-B218-92C8166D3C9A}" srcId="{64202AC5-7621-4BEA-A4C3-4346A3B76C60}" destId="{40B239C4-28FD-4786-82E1-CE8964C229EE}" srcOrd="3" destOrd="0" parTransId="{960179C2-2CB0-4855-B2D8-756AABAA4C52}" sibTransId="{8FFA6799-5F63-4CE2-8037-BE225643027C}"/>
     <dgm:cxn modelId="{2D39F1D5-7BFB-4C2B-9F32-C67995A5BD1A}" type="presParOf" srcId="{22CFCC7D-D6FB-49DD-BAD7-8A4B586ECB8D}" destId="{56144D66-FB86-45AE-A33A-E9F7D053D5EE}" srcOrd="0" destOrd="0" presId="urn:microsoft.com/office/officeart/2005/8/layout/hierarchy5"/>
     <dgm:cxn modelId="{F5E58AD8-6901-45D6-B3DF-094FA00165F6}" type="presParOf" srcId="{56144D66-FB86-45AE-A33A-E9F7D053D5EE}" destId="{32912E5B-8F6B-4581-8516-3616DAC2F968}" srcOrd="0" destOrd="0" presId="urn:microsoft.com/office/officeart/2005/8/layout/hierarchy5"/>
     <dgm:cxn modelId="{C9CDA642-8A59-4F6A-8C77-F76E00AB706F}" type="presParOf" srcId="{56144D66-FB86-45AE-A33A-E9F7D053D5EE}" destId="{C95A114C-3D57-488B-925D-9DE5209E6E39}" srcOrd="1" destOrd="0" presId="urn:microsoft.com/office/officeart/2005/8/layout/hierarchy5"/>
@@ -4380,7 +4514,7 @@
           <a:p>
             <a:fld id="{3DB8CEA6-1520-4954-BE6B-D9A89136BDDD}" type="datetimeFigureOut">
               <a:rPr lang="en-GB" smtClean="0"/>
-              <a:t>28/11/2015</a:t>
+              <a:t>29/12/2015</a:t>
             </a:fld>
             <a:endParaRPr lang="en-GB"/>
           </a:p>
@@ -4550,7 +4684,7 @@
           <a:p>
             <a:fld id="{3DB8CEA6-1520-4954-BE6B-D9A89136BDDD}" type="datetimeFigureOut">
               <a:rPr lang="en-GB" smtClean="0"/>
-              <a:t>28/11/2015</a:t>
+              <a:t>29/12/2015</a:t>
             </a:fld>
             <a:endParaRPr lang="en-GB"/>
           </a:p>
@@ -4730,7 +4864,7 @@
           <a:p>
             <a:fld id="{3DB8CEA6-1520-4954-BE6B-D9A89136BDDD}" type="datetimeFigureOut">
               <a:rPr lang="en-GB" smtClean="0"/>
-              <a:t>28/11/2015</a:t>
+              <a:t>29/12/2015</a:t>
             </a:fld>
             <a:endParaRPr lang="en-GB"/>
           </a:p>
@@ -4900,7 +5034,7 @@
           <a:p>
             <a:fld id="{3DB8CEA6-1520-4954-BE6B-D9A89136BDDD}" type="datetimeFigureOut">
               <a:rPr lang="en-GB" smtClean="0"/>
-              <a:t>28/11/2015</a:t>
+              <a:t>29/12/2015</a:t>
             </a:fld>
             <a:endParaRPr lang="en-GB"/>
           </a:p>
@@ -5146,7 +5280,7 @@
           <a:p>
             <a:fld id="{3DB8CEA6-1520-4954-BE6B-D9A89136BDDD}" type="datetimeFigureOut">
               <a:rPr lang="en-GB" smtClean="0"/>
-              <a:t>28/11/2015</a:t>
+              <a:t>29/12/2015</a:t>
             </a:fld>
             <a:endParaRPr lang="en-GB"/>
           </a:p>
@@ -5378,7 +5512,7 @@
           <a:p>
             <a:fld id="{3DB8CEA6-1520-4954-BE6B-D9A89136BDDD}" type="datetimeFigureOut">
               <a:rPr lang="en-GB" smtClean="0"/>
-              <a:t>28/11/2015</a:t>
+              <a:t>29/12/2015</a:t>
             </a:fld>
             <a:endParaRPr lang="en-GB"/>
           </a:p>
@@ -5745,7 +5879,7 @@
           <a:p>
             <a:fld id="{3DB8CEA6-1520-4954-BE6B-D9A89136BDDD}" type="datetimeFigureOut">
               <a:rPr lang="en-GB" smtClean="0"/>
-              <a:t>28/11/2015</a:t>
+              <a:t>29/12/2015</a:t>
             </a:fld>
             <a:endParaRPr lang="en-GB"/>
           </a:p>
@@ -5863,7 +5997,7 @@
           <a:p>
             <a:fld id="{3DB8CEA6-1520-4954-BE6B-D9A89136BDDD}" type="datetimeFigureOut">
               <a:rPr lang="en-GB" smtClean="0"/>
-              <a:t>28/11/2015</a:t>
+              <a:t>29/12/2015</a:t>
             </a:fld>
             <a:endParaRPr lang="en-GB"/>
           </a:p>
@@ -5958,7 +6092,7 @@
           <a:p>
             <a:fld id="{3DB8CEA6-1520-4954-BE6B-D9A89136BDDD}" type="datetimeFigureOut">
               <a:rPr lang="en-GB" smtClean="0"/>
-              <a:t>28/11/2015</a:t>
+              <a:t>29/12/2015</a:t>
             </a:fld>
             <a:endParaRPr lang="en-GB"/>
           </a:p>
@@ -6235,7 +6369,7 @@
           <a:p>
             <a:fld id="{3DB8CEA6-1520-4954-BE6B-D9A89136BDDD}" type="datetimeFigureOut">
               <a:rPr lang="en-GB" smtClean="0"/>
-              <a:t>28/11/2015</a:t>
+              <a:t>29/12/2015</a:t>
             </a:fld>
             <a:endParaRPr lang="en-GB"/>
           </a:p>
@@ -6488,7 +6622,7 @@
           <a:p>
             <a:fld id="{3DB8CEA6-1520-4954-BE6B-D9A89136BDDD}" type="datetimeFigureOut">
               <a:rPr lang="en-GB" smtClean="0"/>
-              <a:t>28/11/2015</a:t>
+              <a:t>29/12/2015</a:t>
             </a:fld>
             <a:endParaRPr lang="en-GB"/>
           </a:p>
@@ -6701,7 +6835,7 @@
           <a:p>
             <a:fld id="{3DB8CEA6-1520-4954-BE6B-D9A89136BDDD}" type="datetimeFigureOut">
               <a:rPr lang="en-GB" smtClean="0"/>
-              <a:t>28/11/2015</a:t>
+              <a:t>29/12/2015</a:t>
             </a:fld>
             <a:endParaRPr lang="en-GB"/>
           </a:p>
@@ -7438,6 +7572,1206 @@
 </file>
 
 <file path=ppt/slides/slide2.xml><?xml version="1.0" encoding="utf-8"?>
+<p:sld xmlns:a="http://schemas.openxmlformats.org/drawingml/2006/main" xmlns:r="http://schemas.openxmlformats.org/officeDocument/2006/relationships" xmlns:p="http://schemas.openxmlformats.org/presentationml/2006/main">
+  <p:cSld>
+    <p:spTree>
+      <p:nvGrpSpPr>
+        <p:cNvPr id="1" name=""/>
+        <p:cNvGrpSpPr/>
+        <p:nvPr/>
+      </p:nvGrpSpPr>
+      <p:grpSpPr>
+        <a:xfrm>
+          <a:off x="0" y="0"/>
+          <a:ext cx="0" cy="0"/>
+          <a:chOff x="0" y="0"/>
+          <a:chExt cx="0" cy="0"/>
+        </a:xfrm>
+      </p:grpSpPr>
+      <p:sp>
+        <p:nvSpPr>
+          <p:cNvPr id="2" name="Oval 1"/>
+          <p:cNvSpPr/>
+          <p:nvPr/>
+        </p:nvSpPr>
+        <p:spPr>
+          <a:xfrm>
+            <a:off x="1716833" y="3769567"/>
+            <a:ext cx="1194320" cy="1194320"/>
+          </a:xfrm>
+          <a:prstGeom prst="ellipse">
+            <a:avLst/>
+          </a:prstGeom>
+          <a:ln w="28575"/>
+        </p:spPr>
+        <p:style>
+          <a:lnRef idx="2">
+            <a:schemeClr val="dk1"/>
+          </a:lnRef>
+          <a:fillRef idx="1">
+            <a:schemeClr val="lt1"/>
+          </a:fillRef>
+          <a:effectRef idx="0">
+            <a:schemeClr val="dk1"/>
+          </a:effectRef>
+          <a:fontRef idx="minor">
+            <a:schemeClr val="dk1"/>
+          </a:fontRef>
+        </p:style>
+        <p:txBody>
+          <a:bodyPr lIns="36000" rIns="36000" rtlCol="0" anchor="ctr"/>
+          <a:lstStyle/>
+          <a:p>
+            <a:pPr algn="ctr"/>
+            <a:r>
+              <a:rPr lang="en-GB" sz="11500" b="1" dirty="0" smtClean="0"/>
+              <a:t>+</a:t>
+            </a:r>
+            <a:endParaRPr lang="en-GB" sz="11500" b="1" dirty="0"/>
+          </a:p>
+        </p:txBody>
+      </p:sp>
+      <p:sp>
+        <p:nvSpPr>
+          <p:cNvPr id="3" name="Flowchart: Summing Junction 2"/>
+          <p:cNvSpPr/>
+          <p:nvPr/>
+        </p:nvSpPr>
+        <p:spPr>
+          <a:xfrm>
+            <a:off x="1231640" y="951723"/>
+            <a:ext cx="671804" cy="671804"/>
+          </a:xfrm>
+          <a:prstGeom prst="flowChartSummingJunction">
+            <a:avLst/>
+          </a:prstGeom>
+          <a:ln w="28575"/>
+        </p:spPr>
+        <p:style>
+          <a:lnRef idx="2">
+            <a:schemeClr val="dk1"/>
+          </a:lnRef>
+          <a:fillRef idx="1">
+            <a:schemeClr val="lt1"/>
+          </a:fillRef>
+          <a:effectRef idx="0">
+            <a:schemeClr val="dk1"/>
+          </a:effectRef>
+          <a:fontRef idx="minor">
+            <a:schemeClr val="dk1"/>
+          </a:fontRef>
+        </p:style>
+        <p:txBody>
+          <a:bodyPr lIns="36000" rIns="36000" rtlCol="0" anchor="ctr"/>
+          <a:lstStyle/>
+          <a:p>
+            <a:pPr algn="ctr"/>
+            <a:endParaRPr lang="en-GB" sz="2800" dirty="0"/>
+          </a:p>
+        </p:txBody>
+      </p:sp>
+      <p:sp>
+        <p:nvSpPr>
+          <p:cNvPr id="4" name="Rectangle 3"/>
+          <p:cNvSpPr/>
+          <p:nvPr/>
+        </p:nvSpPr>
+        <p:spPr>
+          <a:xfrm>
+            <a:off x="3890866" y="830425"/>
+            <a:ext cx="2780522" cy="914400"/>
+          </a:xfrm>
+          <a:prstGeom prst="rect">
+            <a:avLst/>
+          </a:prstGeom>
+          <a:ln w="28575"/>
+        </p:spPr>
+        <p:style>
+          <a:lnRef idx="2">
+            <a:schemeClr val="dk1"/>
+          </a:lnRef>
+          <a:fillRef idx="1">
+            <a:schemeClr val="lt1"/>
+          </a:fillRef>
+          <a:effectRef idx="0">
+            <a:schemeClr val="dk1"/>
+          </a:effectRef>
+          <a:fontRef idx="minor">
+            <a:schemeClr val="dk1"/>
+          </a:fontRef>
+        </p:style>
+        <p:txBody>
+          <a:bodyPr lIns="36000" rIns="36000" rtlCol="0" anchor="ctr"/>
+          <a:lstStyle/>
+          <a:p>
+            <a:pPr algn="ctr"/>
+            <a:r>
+              <a:rPr lang="en-GB" sz="2800" dirty="0" smtClean="0"/>
+              <a:t>Process I</a:t>
+            </a:r>
+            <a:endParaRPr lang="en-GB" sz="2800" dirty="0"/>
+          </a:p>
+        </p:txBody>
+      </p:sp>
+      <p:sp>
+        <p:nvSpPr>
+          <p:cNvPr id="5" name="TextBox 4"/>
+          <p:cNvSpPr txBox="1"/>
+          <p:nvPr/>
+        </p:nvSpPr>
+        <p:spPr>
+          <a:xfrm>
+            <a:off x="1511973" y="1211232"/>
+            <a:ext cx="183311" cy="523220"/>
+          </a:xfrm>
+          <a:prstGeom prst="rect">
+            <a:avLst/>
+          </a:prstGeom>
+          <a:noFill/>
+          <a:ln w="28575">
+            <a:noFill/>
+          </a:ln>
+        </p:spPr>
+        <p:txBody>
+          <a:bodyPr wrap="none" lIns="36000" rIns="36000" rtlCol="0">
+            <a:spAutoFit/>
+          </a:bodyPr>
+          <a:lstStyle/>
+          <a:p>
+            <a:r>
+              <a:rPr lang="en-GB" sz="2800" dirty="0" smtClean="0"/>
+              <a:t>-</a:t>
+            </a:r>
+            <a:endParaRPr lang="en-GB" sz="2800" dirty="0"/>
+          </a:p>
+        </p:txBody>
+      </p:sp>
+      <p:sp>
+        <p:nvSpPr>
+          <p:cNvPr id="6" name="TextBox 5"/>
+          <p:cNvSpPr txBox="1"/>
+          <p:nvPr/>
+        </p:nvSpPr>
+        <p:spPr>
+          <a:xfrm>
+            <a:off x="1251467" y="1045228"/>
+            <a:ext cx="252239" cy="523220"/>
+          </a:xfrm>
+          <a:prstGeom prst="rect">
+            <a:avLst/>
+          </a:prstGeom>
+          <a:noFill/>
+          <a:ln w="28575">
+            <a:noFill/>
+          </a:ln>
+        </p:spPr>
+        <p:txBody>
+          <a:bodyPr wrap="none" lIns="36000" rIns="36000" rtlCol="0">
+            <a:spAutoFit/>
+          </a:bodyPr>
+          <a:lstStyle/>
+          <a:p>
+            <a:r>
+              <a:rPr lang="en-GB" sz="2800" dirty="0" smtClean="0"/>
+              <a:t>+</a:t>
+            </a:r>
+            <a:endParaRPr lang="en-GB" sz="2800" dirty="0"/>
+          </a:p>
+        </p:txBody>
+      </p:sp>
+      <p:sp>
+        <p:nvSpPr>
+          <p:cNvPr id="7" name="Rectangle 6"/>
+          <p:cNvSpPr/>
+          <p:nvPr/>
+        </p:nvSpPr>
+        <p:spPr>
+          <a:xfrm>
+            <a:off x="4124131" y="2295329"/>
+            <a:ext cx="391886" cy="1045029"/>
+          </a:xfrm>
+          <a:prstGeom prst="rect">
+            <a:avLst/>
+          </a:prstGeom>
+          <a:ln w="28575"/>
+        </p:spPr>
+        <p:style>
+          <a:lnRef idx="2">
+            <a:schemeClr val="dk1"/>
+          </a:lnRef>
+          <a:fillRef idx="1">
+            <a:schemeClr val="lt1"/>
+          </a:fillRef>
+          <a:effectRef idx="0">
+            <a:schemeClr val="dk1"/>
+          </a:effectRef>
+          <a:fontRef idx="minor">
+            <a:schemeClr val="dk1"/>
+          </a:fontRef>
+        </p:style>
+        <p:txBody>
+          <a:bodyPr lIns="36000" rIns="36000" rtlCol="0" anchor="ctr"/>
+          <a:lstStyle/>
+          <a:p>
+            <a:pPr algn="ctr"/>
+            <a:r>
+              <a:rPr lang="en-GB" sz="2800" dirty="0" smtClean="0"/>
+              <a:t>h</a:t>
+            </a:r>
+            <a:r>
+              <a:rPr lang="en-GB" sz="2800" baseline="-25000" dirty="0" smtClean="0"/>
+              <a:t>4</a:t>
+            </a:r>
+            <a:endParaRPr lang="en-GB" sz="2800" baseline="-25000" dirty="0"/>
+          </a:p>
+        </p:txBody>
+      </p:sp>
+      <p:sp>
+        <p:nvSpPr>
+          <p:cNvPr id="8" name="Rectangle 7"/>
+          <p:cNvSpPr/>
+          <p:nvPr/>
+        </p:nvSpPr>
+        <p:spPr>
+          <a:xfrm>
+            <a:off x="5085184" y="2295329"/>
+            <a:ext cx="391886" cy="1045029"/>
+          </a:xfrm>
+          <a:prstGeom prst="rect">
+            <a:avLst/>
+          </a:prstGeom>
+          <a:ln w="28575"/>
+        </p:spPr>
+        <p:style>
+          <a:lnRef idx="2">
+            <a:schemeClr val="dk1"/>
+          </a:lnRef>
+          <a:fillRef idx="1">
+            <a:schemeClr val="lt1"/>
+          </a:fillRef>
+          <a:effectRef idx="0">
+            <a:schemeClr val="dk1"/>
+          </a:effectRef>
+          <a:fontRef idx="minor">
+            <a:schemeClr val="dk1"/>
+          </a:fontRef>
+        </p:style>
+        <p:txBody>
+          <a:bodyPr lIns="36000" rIns="36000" rtlCol="0" anchor="ctr"/>
+          <a:lstStyle/>
+          <a:p>
+            <a:pPr algn="ctr"/>
+            <a:r>
+              <a:rPr lang="en-GB" sz="2800" dirty="0" smtClean="0"/>
+              <a:t>h</a:t>
+            </a:r>
+            <a:r>
+              <a:rPr lang="en-GB" sz="2800" baseline="-25000" dirty="0" smtClean="0"/>
+              <a:t>3</a:t>
+            </a:r>
+            <a:endParaRPr lang="en-GB" sz="2800" baseline="-25000" dirty="0"/>
+          </a:p>
+        </p:txBody>
+      </p:sp>
+      <p:sp>
+        <p:nvSpPr>
+          <p:cNvPr id="9" name="Rectangle 8"/>
+          <p:cNvSpPr/>
+          <p:nvPr/>
+        </p:nvSpPr>
+        <p:spPr>
+          <a:xfrm>
+            <a:off x="6111552" y="2295328"/>
+            <a:ext cx="391886" cy="1045029"/>
+          </a:xfrm>
+          <a:prstGeom prst="rect">
+            <a:avLst/>
+          </a:prstGeom>
+          <a:ln w="28575"/>
+        </p:spPr>
+        <p:style>
+          <a:lnRef idx="2">
+            <a:schemeClr val="dk1"/>
+          </a:lnRef>
+          <a:fillRef idx="1">
+            <a:schemeClr val="lt1"/>
+          </a:fillRef>
+          <a:effectRef idx="0">
+            <a:schemeClr val="dk1"/>
+          </a:effectRef>
+          <a:fontRef idx="minor">
+            <a:schemeClr val="dk1"/>
+          </a:fontRef>
+        </p:style>
+        <p:txBody>
+          <a:bodyPr lIns="36000" rIns="36000" rtlCol="0" anchor="ctr"/>
+          <a:lstStyle/>
+          <a:p>
+            <a:pPr algn="ctr"/>
+            <a:r>
+              <a:rPr lang="en-GB" sz="2800" dirty="0" smtClean="0"/>
+              <a:t>h</a:t>
+            </a:r>
+            <a:r>
+              <a:rPr lang="en-GB" sz="2800" baseline="-25000" dirty="0" smtClean="0"/>
+              <a:t>2</a:t>
+            </a:r>
+            <a:endParaRPr lang="en-GB" sz="2800" baseline="-25000" dirty="0"/>
+          </a:p>
+        </p:txBody>
+      </p:sp>
+      <p:sp>
+        <p:nvSpPr>
+          <p:cNvPr id="10" name="Rectangle 9"/>
+          <p:cNvSpPr/>
+          <p:nvPr/>
+        </p:nvSpPr>
+        <p:spPr>
+          <a:xfrm>
+            <a:off x="8322907" y="1772814"/>
+            <a:ext cx="391886" cy="1045029"/>
+          </a:xfrm>
+          <a:prstGeom prst="rect">
+            <a:avLst/>
+          </a:prstGeom>
+          <a:ln w="28575"/>
+        </p:spPr>
+        <p:style>
+          <a:lnRef idx="2">
+            <a:schemeClr val="dk1"/>
+          </a:lnRef>
+          <a:fillRef idx="1">
+            <a:schemeClr val="lt1"/>
+          </a:fillRef>
+          <a:effectRef idx="0">
+            <a:schemeClr val="dk1"/>
+          </a:effectRef>
+          <a:fontRef idx="minor">
+            <a:schemeClr val="dk1"/>
+          </a:fontRef>
+        </p:style>
+        <p:txBody>
+          <a:bodyPr lIns="36000" rIns="36000" rtlCol="0" anchor="ctr"/>
+          <a:lstStyle/>
+          <a:p>
+            <a:pPr algn="ctr"/>
+            <a:r>
+              <a:rPr lang="en-GB" sz="2800" dirty="0" smtClean="0"/>
+              <a:t>h</a:t>
+            </a:r>
+            <a:r>
+              <a:rPr lang="en-GB" sz="2800" baseline="-25000" dirty="0" smtClean="0"/>
+              <a:t>1</a:t>
+            </a:r>
+            <a:endParaRPr lang="en-GB" sz="2800" baseline="-25000" dirty="0"/>
+          </a:p>
+        </p:txBody>
+      </p:sp>
+      <p:cxnSp>
+        <p:nvCxnSpPr>
+          <p:cNvPr id="12" name="Straight Arrow Connector 11"/>
+          <p:cNvCxnSpPr>
+            <a:stCxn id="3" idx="6"/>
+            <a:endCxn id="4" idx="1"/>
+          </p:cNvCxnSpPr>
+          <p:nvPr/>
+        </p:nvCxnSpPr>
+        <p:spPr>
+          <a:xfrm>
+            <a:off x="1903444" y="1287625"/>
+            <a:ext cx="1987422" cy="0"/>
+          </a:xfrm>
+          <a:prstGeom prst="straightConnector1">
+            <a:avLst/>
+          </a:prstGeom>
+          <a:ln w="28575">
+            <a:tailEnd type="triangle"/>
+          </a:ln>
+        </p:spPr>
+        <p:style>
+          <a:lnRef idx="3">
+            <a:schemeClr val="dk1"/>
+          </a:lnRef>
+          <a:fillRef idx="0">
+            <a:schemeClr val="dk1"/>
+          </a:fillRef>
+          <a:effectRef idx="2">
+            <a:schemeClr val="dk1"/>
+          </a:effectRef>
+          <a:fontRef idx="minor">
+            <a:schemeClr val="tx1"/>
+          </a:fontRef>
+        </p:style>
+      </p:cxnSp>
+      <p:cxnSp>
+        <p:nvCxnSpPr>
+          <p:cNvPr id="14" name="Elbow Connector 13"/>
+          <p:cNvCxnSpPr>
+            <a:stCxn id="4" idx="3"/>
+            <a:endCxn id="10" idx="0"/>
+          </p:cNvCxnSpPr>
+          <p:nvPr/>
+        </p:nvCxnSpPr>
+        <p:spPr>
+          <a:xfrm>
+            <a:off x="6671388" y="1287625"/>
+            <a:ext cx="1847462" cy="485189"/>
+          </a:xfrm>
+          <a:prstGeom prst="bentConnector2">
+            <a:avLst/>
+          </a:prstGeom>
+          <a:ln w="28575">
+            <a:tailEnd type="triangle"/>
+          </a:ln>
+        </p:spPr>
+        <p:style>
+          <a:lnRef idx="3">
+            <a:schemeClr val="dk1"/>
+          </a:lnRef>
+          <a:fillRef idx="0">
+            <a:schemeClr val="dk1"/>
+          </a:fillRef>
+          <a:effectRef idx="2">
+            <a:schemeClr val="dk1"/>
+          </a:effectRef>
+          <a:fontRef idx="minor">
+            <a:schemeClr val="tx1"/>
+          </a:fontRef>
+        </p:style>
+      </p:cxnSp>
+      <p:cxnSp>
+        <p:nvCxnSpPr>
+          <p:cNvPr id="16" name="Straight Arrow Connector 15"/>
+          <p:cNvCxnSpPr>
+            <a:endCxn id="7" idx="0"/>
+          </p:cNvCxnSpPr>
+          <p:nvPr/>
+        </p:nvCxnSpPr>
+        <p:spPr>
+          <a:xfrm>
+            <a:off x="4320074" y="1772814"/>
+            <a:ext cx="0" cy="522515"/>
+          </a:xfrm>
+          <a:prstGeom prst="straightConnector1">
+            <a:avLst/>
+          </a:prstGeom>
+          <a:ln w="28575">
+            <a:solidFill>
+              <a:schemeClr val="tx1"/>
+            </a:solidFill>
+            <a:tailEnd type="triangle"/>
+          </a:ln>
+        </p:spPr>
+        <p:style>
+          <a:lnRef idx="1">
+            <a:schemeClr val="accent1"/>
+          </a:lnRef>
+          <a:fillRef idx="0">
+            <a:schemeClr val="accent1"/>
+          </a:fillRef>
+          <a:effectRef idx="0">
+            <a:schemeClr val="accent1"/>
+          </a:effectRef>
+          <a:fontRef idx="minor">
+            <a:schemeClr val="tx1"/>
+          </a:fontRef>
+        </p:style>
+      </p:cxnSp>
+      <p:cxnSp>
+        <p:nvCxnSpPr>
+          <p:cNvPr id="17" name="Straight Arrow Connector 16"/>
+          <p:cNvCxnSpPr/>
+          <p:nvPr/>
+        </p:nvCxnSpPr>
+        <p:spPr>
+          <a:xfrm>
+            <a:off x="5253136" y="1744825"/>
+            <a:ext cx="0" cy="522515"/>
+          </a:xfrm>
+          <a:prstGeom prst="straightConnector1">
+            <a:avLst/>
+          </a:prstGeom>
+          <a:ln w="28575">
+            <a:solidFill>
+              <a:schemeClr val="tx1"/>
+            </a:solidFill>
+            <a:tailEnd type="triangle"/>
+          </a:ln>
+        </p:spPr>
+        <p:style>
+          <a:lnRef idx="1">
+            <a:schemeClr val="accent1"/>
+          </a:lnRef>
+          <a:fillRef idx="0">
+            <a:schemeClr val="accent1"/>
+          </a:fillRef>
+          <a:effectRef idx="0">
+            <a:schemeClr val="accent1"/>
+          </a:effectRef>
+          <a:fontRef idx="minor">
+            <a:schemeClr val="tx1"/>
+          </a:fontRef>
+        </p:style>
+      </p:cxnSp>
+      <p:cxnSp>
+        <p:nvCxnSpPr>
+          <p:cNvPr id="18" name="Straight Arrow Connector 17"/>
+          <p:cNvCxnSpPr/>
+          <p:nvPr/>
+        </p:nvCxnSpPr>
+        <p:spPr>
+          <a:xfrm>
+            <a:off x="6279504" y="1744825"/>
+            <a:ext cx="0" cy="522515"/>
+          </a:xfrm>
+          <a:prstGeom prst="straightConnector1">
+            <a:avLst/>
+          </a:prstGeom>
+          <a:ln w="28575">
+            <a:solidFill>
+              <a:schemeClr val="tx1"/>
+            </a:solidFill>
+            <a:tailEnd type="triangle"/>
+          </a:ln>
+        </p:spPr>
+        <p:style>
+          <a:lnRef idx="1">
+            <a:schemeClr val="accent1"/>
+          </a:lnRef>
+          <a:fillRef idx="0">
+            <a:schemeClr val="accent1"/>
+          </a:fillRef>
+          <a:effectRef idx="0">
+            <a:schemeClr val="accent1"/>
+          </a:effectRef>
+          <a:fontRef idx="minor">
+            <a:schemeClr val="tx1"/>
+          </a:fontRef>
+        </p:style>
+      </p:cxnSp>
+      <p:cxnSp>
+        <p:nvCxnSpPr>
+          <p:cNvPr id="20" name="Elbow Connector 19"/>
+          <p:cNvCxnSpPr>
+            <a:stCxn id="7" idx="2"/>
+            <a:endCxn id="2" idx="7"/>
+          </p:cNvCxnSpPr>
+          <p:nvPr/>
+        </p:nvCxnSpPr>
+        <p:spPr>
+          <a:xfrm rot="5400000">
+            <a:off x="3226106" y="2850502"/>
+            <a:ext cx="604113" cy="1583825"/>
+          </a:xfrm>
+          <a:prstGeom prst="bentConnector3">
+            <a:avLst>
+              <a:gd name="adj1" fmla="val 93246"/>
+            </a:avLst>
+          </a:prstGeom>
+          <a:ln w="28575">
+            <a:solidFill>
+              <a:schemeClr val="tx1"/>
+            </a:solidFill>
+            <a:tailEnd type="triangle"/>
+          </a:ln>
+        </p:spPr>
+        <p:style>
+          <a:lnRef idx="1">
+            <a:schemeClr val="accent1"/>
+          </a:lnRef>
+          <a:fillRef idx="0">
+            <a:schemeClr val="accent1"/>
+          </a:fillRef>
+          <a:effectRef idx="0">
+            <a:schemeClr val="accent1"/>
+          </a:effectRef>
+          <a:fontRef idx="minor">
+            <a:schemeClr val="tx1"/>
+          </a:fontRef>
+        </p:style>
+      </p:cxnSp>
+      <p:cxnSp>
+        <p:nvCxnSpPr>
+          <p:cNvPr id="23" name="Elbow Connector 22"/>
+          <p:cNvCxnSpPr>
+            <a:stCxn id="10" idx="2"/>
+            <a:endCxn id="2" idx="5"/>
+          </p:cNvCxnSpPr>
+          <p:nvPr/>
+        </p:nvCxnSpPr>
+        <p:spPr>
+          <a:xfrm rot="5400000">
+            <a:off x="4641980" y="912113"/>
+            <a:ext cx="1971140" cy="5782601"/>
+          </a:xfrm>
+          <a:prstGeom prst="bentConnector3">
+            <a:avLst>
+              <a:gd name="adj1" fmla="val 101536"/>
+            </a:avLst>
+          </a:prstGeom>
+          <a:ln w="28575">
+            <a:solidFill>
+              <a:schemeClr val="tx1"/>
+            </a:solidFill>
+            <a:tailEnd type="triangle"/>
+          </a:ln>
+        </p:spPr>
+        <p:style>
+          <a:lnRef idx="1">
+            <a:schemeClr val="accent1"/>
+          </a:lnRef>
+          <a:fillRef idx="0">
+            <a:schemeClr val="accent1"/>
+          </a:fillRef>
+          <a:effectRef idx="0">
+            <a:schemeClr val="accent1"/>
+          </a:effectRef>
+          <a:fontRef idx="minor">
+            <a:schemeClr val="tx1"/>
+          </a:fontRef>
+        </p:style>
+      </p:cxnSp>
+      <p:cxnSp>
+        <p:nvCxnSpPr>
+          <p:cNvPr id="26" name="Elbow Connector 25"/>
+          <p:cNvCxnSpPr>
+            <a:stCxn id="9" idx="2"/>
+          </p:cNvCxnSpPr>
+          <p:nvPr/>
+        </p:nvCxnSpPr>
+        <p:spPr>
+          <a:xfrm rot="5400000">
+            <a:off x="3967843" y="2269669"/>
+            <a:ext cx="1268965" cy="3410340"/>
+          </a:xfrm>
+          <a:prstGeom prst="bentConnector2">
+            <a:avLst/>
+          </a:prstGeom>
+          <a:ln w="28575">
+            <a:solidFill>
+              <a:schemeClr val="tx1"/>
+            </a:solidFill>
+            <a:tailEnd type="triangle"/>
+          </a:ln>
+        </p:spPr>
+        <p:style>
+          <a:lnRef idx="1">
+            <a:schemeClr val="accent1"/>
+          </a:lnRef>
+          <a:fillRef idx="0">
+            <a:schemeClr val="accent1"/>
+          </a:fillRef>
+          <a:effectRef idx="0">
+            <a:schemeClr val="accent1"/>
+          </a:effectRef>
+          <a:fontRef idx="minor">
+            <a:schemeClr val="tx1"/>
+          </a:fontRef>
+        </p:style>
+      </p:cxnSp>
+      <p:cxnSp>
+        <p:nvCxnSpPr>
+          <p:cNvPr id="30" name="Elbow Connector 29"/>
+          <p:cNvCxnSpPr>
+            <a:stCxn id="8" idx="2"/>
+          </p:cNvCxnSpPr>
+          <p:nvPr/>
+        </p:nvCxnSpPr>
+        <p:spPr>
+          <a:xfrm rot="5400000">
+            <a:off x="3645937" y="2591576"/>
+            <a:ext cx="886408" cy="2383972"/>
+          </a:xfrm>
+          <a:prstGeom prst="bentConnector2">
+            <a:avLst/>
+          </a:prstGeom>
+          <a:ln w="28575">
+            <a:solidFill>
+              <a:schemeClr val="tx1"/>
+            </a:solidFill>
+            <a:tailEnd type="triangle"/>
+          </a:ln>
+        </p:spPr>
+        <p:style>
+          <a:lnRef idx="1">
+            <a:schemeClr val="accent1"/>
+          </a:lnRef>
+          <a:fillRef idx="0">
+            <a:schemeClr val="accent1"/>
+          </a:fillRef>
+          <a:effectRef idx="0">
+            <a:schemeClr val="accent1"/>
+          </a:effectRef>
+          <a:fontRef idx="minor">
+            <a:schemeClr val="tx1"/>
+          </a:fontRef>
+        </p:style>
+      </p:cxnSp>
+      <p:cxnSp>
+        <p:nvCxnSpPr>
+          <p:cNvPr id="31" name="Straight Arrow Connector 30"/>
+          <p:cNvCxnSpPr/>
+          <p:nvPr/>
+        </p:nvCxnSpPr>
+        <p:spPr>
+          <a:xfrm>
+            <a:off x="514350" y="1296957"/>
+            <a:ext cx="717290" cy="0"/>
+          </a:xfrm>
+          <a:prstGeom prst="straightConnector1">
+            <a:avLst/>
+          </a:prstGeom>
+          <a:ln w="28575">
+            <a:tailEnd type="triangle"/>
+          </a:ln>
+        </p:spPr>
+        <p:style>
+          <a:lnRef idx="3">
+            <a:schemeClr val="dk1"/>
+          </a:lnRef>
+          <a:fillRef idx="0">
+            <a:schemeClr val="dk1"/>
+          </a:fillRef>
+          <a:effectRef idx="2">
+            <a:schemeClr val="dk1"/>
+          </a:effectRef>
+          <a:fontRef idx="minor">
+            <a:schemeClr val="tx1"/>
+          </a:fontRef>
+        </p:style>
+      </p:cxnSp>
+      <p:cxnSp>
+        <p:nvCxnSpPr>
+          <p:cNvPr id="33" name="Elbow Connector 32"/>
+          <p:cNvCxnSpPr>
+            <a:stCxn id="2" idx="2"/>
+          </p:cNvCxnSpPr>
+          <p:nvPr/>
+        </p:nvCxnSpPr>
+        <p:spPr>
+          <a:xfrm rot="10800000">
+            <a:off x="1567543" y="1654173"/>
+            <a:ext cx="149291" cy="2712554"/>
+          </a:xfrm>
+          <a:prstGeom prst="bentConnector2">
+            <a:avLst/>
+          </a:prstGeom>
+          <a:ln w="28575">
+            <a:solidFill>
+              <a:schemeClr val="tx1"/>
+            </a:solidFill>
+            <a:tailEnd type="triangle"/>
+          </a:ln>
+        </p:spPr>
+        <p:style>
+          <a:lnRef idx="1">
+            <a:schemeClr val="accent1"/>
+          </a:lnRef>
+          <a:fillRef idx="0">
+            <a:schemeClr val="accent1"/>
+          </a:fillRef>
+          <a:effectRef idx="0">
+            <a:schemeClr val="accent1"/>
+          </a:effectRef>
+          <a:fontRef idx="minor">
+            <a:schemeClr val="tx1"/>
+          </a:fontRef>
+        </p:style>
+      </p:cxnSp>
+      <p:cxnSp>
+        <p:nvCxnSpPr>
+          <p:cNvPr id="38" name="Straight Arrow Connector 37"/>
+          <p:cNvCxnSpPr/>
+          <p:nvPr/>
+        </p:nvCxnSpPr>
+        <p:spPr>
+          <a:xfrm>
+            <a:off x="8518850" y="1287625"/>
+            <a:ext cx="717290" cy="0"/>
+          </a:xfrm>
+          <a:prstGeom prst="straightConnector1">
+            <a:avLst/>
+          </a:prstGeom>
+          <a:ln w="28575">
+            <a:tailEnd type="triangle"/>
+          </a:ln>
+        </p:spPr>
+        <p:style>
+          <a:lnRef idx="3">
+            <a:schemeClr val="dk1"/>
+          </a:lnRef>
+          <a:fillRef idx="0">
+            <a:schemeClr val="dk1"/>
+          </a:fillRef>
+          <a:effectRef idx="2">
+            <a:schemeClr val="dk1"/>
+          </a:effectRef>
+          <a:fontRef idx="minor">
+            <a:schemeClr val="tx1"/>
+          </a:fontRef>
+        </p:style>
+      </p:cxnSp>
+      <p:sp>
+        <p:nvSpPr>
+          <p:cNvPr id="39" name="TextBox 38"/>
+          <p:cNvSpPr txBox="1"/>
+          <p:nvPr/>
+        </p:nvSpPr>
+        <p:spPr>
+          <a:xfrm>
+            <a:off x="-42842" y="1472842"/>
+            <a:ext cx="1394347" cy="400110"/>
+          </a:xfrm>
+          <a:prstGeom prst="rect">
+            <a:avLst/>
+          </a:prstGeom>
+          <a:noFill/>
+          <a:ln w="28575">
+            <a:noFill/>
+          </a:ln>
+        </p:spPr>
+        <p:txBody>
+          <a:bodyPr wrap="none" lIns="36000" rIns="36000" rtlCol="0">
+            <a:spAutoFit/>
+          </a:bodyPr>
+          <a:lstStyle/>
+          <a:p>
+            <a:r>
+              <a:rPr lang="en-GB" sz="2000" dirty="0" smtClean="0"/>
+              <a:t>Set Point r(t)</a:t>
+            </a:r>
+            <a:endParaRPr lang="en-GB" sz="2000" dirty="0"/>
+          </a:p>
+        </p:txBody>
+      </p:sp>
+      <p:sp>
+        <p:nvSpPr>
+          <p:cNvPr id="40" name="TextBox 39"/>
+          <p:cNvSpPr txBox="1"/>
+          <p:nvPr/>
+        </p:nvSpPr>
+        <p:spPr>
+          <a:xfrm>
+            <a:off x="1935696" y="846900"/>
+            <a:ext cx="1913656" cy="400110"/>
+          </a:xfrm>
+          <a:prstGeom prst="rect">
+            <a:avLst/>
+          </a:prstGeom>
+          <a:noFill/>
+          <a:ln w="28575">
+            <a:noFill/>
+          </a:ln>
+        </p:spPr>
+        <p:txBody>
+          <a:bodyPr wrap="none" lIns="36000" rIns="36000" rtlCol="0">
+            <a:spAutoFit/>
+          </a:bodyPr>
+          <a:lstStyle/>
+          <a:p>
+            <a:r>
+              <a:rPr lang="en-GB" sz="2000" dirty="0" smtClean="0"/>
+              <a:t>Process Input u(t)</a:t>
+            </a:r>
+            <a:endParaRPr lang="en-GB" sz="2000" dirty="0"/>
+          </a:p>
+        </p:txBody>
+      </p:sp>
+      <p:sp>
+        <p:nvSpPr>
+          <p:cNvPr id="41" name="TextBox 40"/>
+          <p:cNvSpPr txBox="1"/>
+          <p:nvPr/>
+        </p:nvSpPr>
+        <p:spPr>
+          <a:xfrm>
+            <a:off x="7938019" y="845173"/>
+            <a:ext cx="1236483" cy="400110"/>
+          </a:xfrm>
+          <a:prstGeom prst="rect">
+            <a:avLst/>
+          </a:prstGeom>
+          <a:noFill/>
+          <a:ln w="28575">
+            <a:noFill/>
+          </a:ln>
+        </p:spPr>
+        <p:txBody>
+          <a:bodyPr wrap="none" lIns="36000" rIns="36000" rtlCol="0">
+            <a:spAutoFit/>
+          </a:bodyPr>
+          <a:lstStyle/>
+          <a:p>
+            <a:pPr algn="ctr"/>
+            <a:r>
+              <a:rPr lang="en-GB" sz="2000" dirty="0" smtClean="0"/>
+              <a:t>Output y(t)</a:t>
+            </a:r>
+            <a:endParaRPr lang="en-GB" sz="2000" dirty="0"/>
+          </a:p>
+        </p:txBody>
+      </p:sp>
+      <p:sp>
+        <p:nvSpPr>
+          <p:cNvPr id="42" name="TextBox 41"/>
+          <p:cNvSpPr txBox="1"/>
+          <p:nvPr/>
+        </p:nvSpPr>
+        <p:spPr>
+          <a:xfrm>
+            <a:off x="1664373" y="1363632"/>
+            <a:ext cx="183311" cy="523220"/>
+          </a:xfrm>
+          <a:prstGeom prst="rect">
+            <a:avLst/>
+          </a:prstGeom>
+          <a:noFill/>
+          <a:ln w="28575">
+            <a:noFill/>
+          </a:ln>
+        </p:spPr>
+        <p:txBody>
+          <a:bodyPr wrap="none" lIns="36000" rIns="36000" rtlCol="0">
+            <a:spAutoFit/>
+          </a:bodyPr>
+          <a:lstStyle/>
+          <a:p>
+            <a:r>
+              <a:rPr lang="en-GB" sz="2800" dirty="0" smtClean="0"/>
+              <a:t>-</a:t>
+            </a:r>
+            <a:endParaRPr lang="en-GB" sz="2800" dirty="0"/>
+          </a:p>
+        </p:txBody>
+      </p:sp>
+      <p:sp>
+        <p:nvSpPr>
+          <p:cNvPr id="43" name="TextBox 42"/>
+          <p:cNvSpPr txBox="1"/>
+          <p:nvPr/>
+        </p:nvSpPr>
+        <p:spPr>
+          <a:xfrm>
+            <a:off x="8658589" y="1368393"/>
+            <a:ext cx="1811962" cy="400110"/>
+          </a:xfrm>
+          <a:prstGeom prst="rect">
+            <a:avLst/>
+          </a:prstGeom>
+          <a:noFill/>
+          <a:ln w="28575">
+            <a:noFill/>
+          </a:ln>
+        </p:spPr>
+        <p:txBody>
+          <a:bodyPr wrap="none" lIns="36000" rIns="36000" rtlCol="0">
+            <a:spAutoFit/>
+          </a:bodyPr>
+          <a:lstStyle/>
+          <a:p>
+            <a:pPr algn="ctr"/>
+            <a:r>
+              <a:rPr lang="en-GB" sz="2000" dirty="0" smtClean="0"/>
+              <a:t>Output is also x</a:t>
+            </a:r>
+            <a:r>
+              <a:rPr lang="en-GB" sz="2000" baseline="-25000" dirty="0" smtClean="0"/>
+              <a:t>1</a:t>
+            </a:r>
+            <a:endParaRPr lang="en-GB" sz="2000" baseline="-25000" dirty="0"/>
+          </a:p>
+        </p:txBody>
+      </p:sp>
+      <p:sp>
+        <p:nvSpPr>
+          <p:cNvPr id="44" name="TextBox 43"/>
+          <p:cNvSpPr txBox="1"/>
+          <p:nvPr/>
+        </p:nvSpPr>
+        <p:spPr>
+          <a:xfrm>
+            <a:off x="7807226" y="1368589"/>
+            <a:ext cx="564826" cy="400110"/>
+          </a:xfrm>
+          <a:prstGeom prst="rect">
+            <a:avLst/>
+          </a:prstGeom>
+          <a:noFill/>
+          <a:ln w="28575">
+            <a:noFill/>
+          </a:ln>
+        </p:spPr>
+        <p:txBody>
+          <a:bodyPr wrap="none" lIns="36000" rIns="36000" rtlCol="0">
+            <a:spAutoFit/>
+          </a:bodyPr>
+          <a:lstStyle/>
+          <a:p>
+            <a:pPr algn="ctr"/>
+            <a:r>
+              <a:rPr lang="en-GB" sz="2000" dirty="0" smtClean="0"/>
+              <a:t>x</a:t>
+            </a:r>
+            <a:r>
+              <a:rPr lang="en-GB" sz="2000" baseline="-25000" dirty="0" smtClean="0"/>
+              <a:t>1(</a:t>
+            </a:r>
+            <a:r>
+              <a:rPr lang="en-GB" sz="2000" dirty="0" smtClean="0"/>
+              <a:t>(t)</a:t>
+            </a:r>
+            <a:endParaRPr lang="en-GB" sz="2000" baseline="-25000" dirty="0"/>
+          </a:p>
+        </p:txBody>
+      </p:sp>
+      <p:sp>
+        <p:nvSpPr>
+          <p:cNvPr id="45" name="TextBox 44"/>
+          <p:cNvSpPr txBox="1"/>
+          <p:nvPr/>
+        </p:nvSpPr>
+        <p:spPr>
+          <a:xfrm>
+            <a:off x="6310409" y="3516689"/>
+            <a:ext cx="564826" cy="400110"/>
+          </a:xfrm>
+          <a:prstGeom prst="rect">
+            <a:avLst/>
+          </a:prstGeom>
+          <a:noFill/>
+          <a:ln w="28575">
+            <a:noFill/>
+          </a:ln>
+        </p:spPr>
+        <p:txBody>
+          <a:bodyPr wrap="none" lIns="36000" rIns="36000" rtlCol="0">
+            <a:spAutoFit/>
+          </a:bodyPr>
+          <a:lstStyle/>
+          <a:p>
+            <a:pPr algn="ctr"/>
+            <a:r>
+              <a:rPr lang="en-GB" sz="2000" dirty="0" smtClean="0"/>
+              <a:t>x</a:t>
+            </a:r>
+            <a:r>
+              <a:rPr lang="en-GB" sz="2000" baseline="-25000" dirty="0" smtClean="0"/>
+              <a:t>2(</a:t>
+            </a:r>
+            <a:r>
+              <a:rPr lang="en-GB" sz="2000" dirty="0" smtClean="0"/>
+              <a:t>(t)</a:t>
+            </a:r>
+            <a:endParaRPr lang="en-GB" sz="2000" baseline="-25000" dirty="0"/>
+          </a:p>
+        </p:txBody>
+      </p:sp>
+      <p:sp>
+        <p:nvSpPr>
+          <p:cNvPr id="46" name="TextBox 45"/>
+          <p:cNvSpPr txBox="1"/>
+          <p:nvPr/>
+        </p:nvSpPr>
+        <p:spPr>
+          <a:xfrm>
+            <a:off x="5339489" y="3544362"/>
+            <a:ext cx="564826" cy="400110"/>
+          </a:xfrm>
+          <a:prstGeom prst="rect">
+            <a:avLst/>
+          </a:prstGeom>
+          <a:noFill/>
+          <a:ln w="28575">
+            <a:noFill/>
+          </a:ln>
+        </p:spPr>
+        <p:txBody>
+          <a:bodyPr wrap="none" lIns="36000" rIns="36000" rtlCol="0">
+            <a:spAutoFit/>
+          </a:bodyPr>
+          <a:lstStyle/>
+          <a:p>
+            <a:pPr algn="ctr"/>
+            <a:r>
+              <a:rPr lang="en-GB" sz="2000" dirty="0" smtClean="0"/>
+              <a:t>x</a:t>
+            </a:r>
+            <a:r>
+              <a:rPr lang="en-GB" sz="2000" baseline="-25000" dirty="0"/>
+              <a:t>3</a:t>
+            </a:r>
+            <a:r>
+              <a:rPr lang="en-GB" sz="2000" baseline="-25000" dirty="0" smtClean="0"/>
+              <a:t>(</a:t>
+            </a:r>
+            <a:r>
+              <a:rPr lang="en-GB" sz="2000" dirty="0" smtClean="0"/>
+              <a:t>(t)</a:t>
+            </a:r>
+            <a:endParaRPr lang="en-GB" sz="2000" baseline="-25000" dirty="0"/>
+          </a:p>
+        </p:txBody>
+      </p:sp>
+      <p:sp>
+        <p:nvSpPr>
+          <p:cNvPr id="47" name="TextBox 46"/>
+          <p:cNvSpPr txBox="1"/>
+          <p:nvPr/>
+        </p:nvSpPr>
+        <p:spPr>
+          <a:xfrm>
+            <a:off x="4452337" y="3544362"/>
+            <a:ext cx="564826" cy="400110"/>
+          </a:xfrm>
+          <a:prstGeom prst="rect">
+            <a:avLst/>
+          </a:prstGeom>
+          <a:noFill/>
+          <a:ln w="28575">
+            <a:noFill/>
+          </a:ln>
+        </p:spPr>
+        <p:txBody>
+          <a:bodyPr wrap="none" lIns="36000" rIns="36000" rtlCol="0">
+            <a:spAutoFit/>
+          </a:bodyPr>
+          <a:lstStyle/>
+          <a:p>
+            <a:pPr algn="ctr"/>
+            <a:r>
+              <a:rPr lang="en-GB" sz="2000" dirty="0" smtClean="0"/>
+              <a:t>x</a:t>
+            </a:r>
+            <a:r>
+              <a:rPr lang="en-GB" sz="2000" baseline="-25000" dirty="0"/>
+              <a:t>4</a:t>
+            </a:r>
+            <a:r>
+              <a:rPr lang="en-GB" sz="2000" baseline="-25000" dirty="0" smtClean="0"/>
+              <a:t>(</a:t>
+            </a:r>
+            <a:r>
+              <a:rPr lang="en-GB" sz="2000" dirty="0" smtClean="0"/>
+              <a:t>(t)</a:t>
+            </a:r>
+            <a:endParaRPr lang="en-GB" sz="2000" baseline="-25000" dirty="0"/>
+          </a:p>
+        </p:txBody>
+      </p:sp>
+    </p:spTree>
+    <p:extLst>
+      <p:ext uri="{BB962C8B-B14F-4D97-AF65-F5344CB8AC3E}">
+        <p14:creationId xmlns:p14="http://schemas.microsoft.com/office/powerpoint/2010/main" val="1322580318"/>
+      </p:ext>
+    </p:extLst>
+  </p:cSld>
+  <p:clrMapOvr>
+    <a:masterClrMapping/>
+  </p:clrMapOvr>
+</p:sld>
+</file>
+
+<file path=ppt/slides/slide3.xml><?xml version="1.0" encoding="utf-8"?>
 <p:sld xmlns:a="http://schemas.openxmlformats.org/drawingml/2006/main" xmlns:r="http://schemas.openxmlformats.org/officeDocument/2006/relationships" xmlns:p="http://schemas.openxmlformats.org/presentationml/2006/main">
   <p:cSld>
     <p:spTree>

</xml_diff>